<commit_message>
mise a jour cours 01
</commit_message>
<xml_diff>
--- a/remironfard/2015_01_Rendu.pptx
+++ b/remironfard/2015_01_Rendu.pptx
@@ -5,10 +5,10 @@
     <p:sldMasterId id="2147483648" r:id="rId1"/>
   </p:sldMasterIdLst>
   <p:notesMasterIdLst>
-    <p:notesMasterId r:id="rId68"/>
+    <p:notesMasterId r:id="rId64"/>
   </p:notesMasterIdLst>
   <p:handoutMasterIdLst>
-    <p:handoutMasterId r:id="rId69"/>
+    <p:handoutMasterId r:id="rId65"/>
   </p:handoutMasterIdLst>
   <p:sldIdLst>
     <p:sldId id="281" r:id="rId2"/>
@@ -73,10 +73,6 @@
     <p:sldId id="327" r:id="rId61"/>
     <p:sldId id="328" r:id="rId62"/>
     <p:sldId id="330" r:id="rId63"/>
-    <p:sldId id="331" r:id="rId64"/>
-    <p:sldId id="329" r:id="rId65"/>
-    <p:sldId id="332" r:id="rId66"/>
-    <p:sldId id="333" r:id="rId67"/>
   </p:sldIdLst>
   <p:sldSz cx="9144000" cy="6858000" type="screen4x3"/>
   <p:notesSz cx="6858000" cy="9144000"/>
@@ -260,7 +256,7 @@
           <a:p>
             <a:fld id="{801DB4AD-0506-804D-9177-ECB4D2AAA278}" type="datetimeFigureOut">
               <a:rPr lang="fr-FR" smtClean="0"/>
-              <a:t>07/09/15</a:t>
+              <a:t>17/09/15</a:t>
             </a:fld>
             <a:endParaRPr lang="fr-FR"/>
           </a:p>
@@ -426,7 +422,7 @@
           <a:p>
             <a:fld id="{A81B47BE-82C2-FD4D-9B98-CA52A80151C0}" type="datetimeFigureOut">
               <a:rPr lang="fr-FR" smtClean="0"/>
-              <a:t>07/09/15</a:t>
+              <a:t>17/09/15</a:t>
             </a:fld>
             <a:endParaRPr lang="fr-FR"/>
           </a:p>
@@ -1236,7 +1232,7 @@
           <a:p>
             <a:fld id="{19038BA7-713C-2544-8829-1AE6272C1240}" type="datetime1">
               <a:rPr lang="fr-FR" smtClean="0"/>
-              <a:t>07/09/15</a:t>
+              <a:t>17/09/15</a:t>
             </a:fld>
             <a:endParaRPr lang="fr-FR" dirty="0"/>
           </a:p>
@@ -1572,7 +1568,7 @@
           <a:p>
             <a:fld id="{19038BA7-713C-2544-8829-1AE6272C1240}" type="datetime1">
               <a:rPr lang="fr-FR" smtClean="0"/>
-              <a:t>07/09/15</a:t>
+              <a:t>17/09/15</a:t>
             </a:fld>
             <a:endParaRPr lang="fr-FR" dirty="0"/>
           </a:p>
@@ -1956,7 +1952,7 @@
           <a:p>
             <a:fld id="{90F72DDC-563B-C341-83C2-E73D8B258BF3}" type="datetime1">
               <a:rPr lang="fr-FR" smtClean="0"/>
-              <a:t>07/09/15</a:t>
+              <a:t>17/09/15</a:t>
             </a:fld>
             <a:endParaRPr lang="fr-FR" dirty="0"/>
           </a:p>
@@ -2388,7 +2384,7 @@
           <a:p>
             <a:fld id="{213233DE-E2B7-914A-A9A2-B94007DE19EE}" type="datetime1">
               <a:rPr lang="fr-FR" smtClean="0"/>
-              <a:t>07/09/15</a:t>
+              <a:t>17/09/15</a:t>
             </a:fld>
             <a:endParaRPr lang="fr-FR" dirty="0"/>
           </a:p>
@@ -2820,7 +2816,7 @@
           <a:p>
             <a:fld id="{C42B5CCB-00AF-494F-BB8F-8549A9D97B0C}" type="datetime1">
               <a:rPr lang="fr-FR" smtClean="0"/>
-              <a:t>07/09/15</a:t>
+              <a:t>17/09/15</a:t>
             </a:fld>
             <a:endParaRPr lang="fr-FR" dirty="0"/>
           </a:p>
@@ -3252,7 +3248,7 @@
           <a:p>
             <a:fld id="{D982A0D6-A7C2-DA44-8C91-0D82881601ED}" type="datetime1">
               <a:rPr lang="fr-FR" smtClean="0"/>
-              <a:t>07/09/15</a:t>
+              <a:t>17/09/15</a:t>
             </a:fld>
             <a:endParaRPr lang="fr-FR" dirty="0"/>
           </a:p>
@@ -3684,7 +3680,7 @@
           <a:p>
             <a:fld id="{3D85F28E-A20A-254E-B4B9-91D136105DD0}" type="datetime1">
               <a:rPr lang="fr-FR" smtClean="0"/>
-              <a:t>07/09/15</a:t>
+              <a:t>17/09/15</a:t>
             </a:fld>
             <a:endParaRPr lang="fr-FR" dirty="0"/>
           </a:p>
@@ -4408,7 +4404,7 @@
           <a:p>
             <a:fld id="{FAED594A-145F-964F-8801-3C0B09F2379E}" type="datetime1">
               <a:rPr lang="fr-FR" smtClean="0"/>
-              <a:t>07/09/15</a:t>
+              <a:t>17/09/15</a:t>
             </a:fld>
             <a:endParaRPr lang="fr-FR" dirty="0"/>
           </a:p>
@@ -5464,7 +5460,7 @@
           <a:p>
             <a:fld id="{19038BA7-713C-2544-8829-1AE6272C1240}" type="datetime1">
               <a:rPr lang="fr-FR" smtClean="0"/>
-              <a:t>07/09/15</a:t>
+              <a:t>17/09/15</a:t>
             </a:fld>
             <a:endParaRPr lang="fr-FR" dirty="0"/>
           </a:p>
@@ -5676,7 +5672,7 @@
           <a:p>
             <a:fld id="{19038BA7-713C-2544-8829-1AE6272C1240}" type="datetime1">
               <a:rPr lang="fr-FR" smtClean="0"/>
-              <a:t>07/09/15</a:t>
+              <a:t>17/09/15</a:t>
             </a:fld>
             <a:endParaRPr lang="fr-FR" dirty="0"/>
           </a:p>
@@ -5951,7 +5947,7 @@
           <a:p>
             <a:fld id="{19038BA7-713C-2544-8829-1AE6272C1240}" type="datetime1">
               <a:rPr lang="fr-FR" smtClean="0"/>
-              <a:t>07/09/15</a:t>
+              <a:t>17/09/15</a:t>
             </a:fld>
             <a:endParaRPr lang="fr-FR" dirty="0"/>
           </a:p>
@@ -6150,7 +6146,7 @@
           <a:p>
             <a:fld id="{19038BA7-713C-2544-8829-1AE6272C1240}" type="datetime1">
               <a:rPr lang="fr-FR" smtClean="0"/>
-              <a:t>07/09/15</a:t>
+              <a:t>17/09/15</a:t>
             </a:fld>
             <a:endParaRPr lang="fr-FR" dirty="0"/>
           </a:p>
@@ -6320,7 +6316,7 @@
           <a:p>
             <a:fld id="{19038BA7-713C-2544-8829-1AE6272C1240}" type="datetime1">
               <a:rPr lang="fr-FR" smtClean="0"/>
-              <a:t>07/09/15</a:t>
+              <a:t>17/09/15</a:t>
             </a:fld>
             <a:endParaRPr lang="fr-FR" dirty="0"/>
           </a:p>
@@ -6458,7 +6454,7 @@
           <a:p>
             <a:fld id="{19038BA7-713C-2544-8829-1AE6272C1240}" type="datetime1">
               <a:rPr lang="fr-FR" smtClean="0"/>
-              <a:t>07/09/15</a:t>
+              <a:t>17/09/15</a:t>
             </a:fld>
             <a:endParaRPr lang="fr-FR" dirty="0"/>
           </a:p>
@@ -6648,7 +6644,7 @@
           <a:p>
             <a:fld id="{19038BA7-713C-2544-8829-1AE6272C1240}" type="datetime1">
               <a:rPr lang="fr-FR" smtClean="0"/>
-              <a:t>07/09/15</a:t>
+              <a:t>17/09/15</a:t>
             </a:fld>
             <a:endParaRPr lang="fr-FR" dirty="0"/>
           </a:p>
@@ -6793,7 +6789,7 @@
           <a:p>
             <a:fld id="{19038BA7-713C-2544-8829-1AE6272C1240}" type="datetime1">
               <a:rPr lang="fr-FR" smtClean="0"/>
-              <a:t>07/09/15</a:t>
+              <a:t>17/09/15</a:t>
             </a:fld>
             <a:endParaRPr lang="fr-FR" dirty="0"/>
           </a:p>
@@ -6977,7 +6973,7 @@
           <a:p>
             <a:fld id="{90F72DDC-563B-C341-83C2-E73D8B258BF3}" type="datetime1">
               <a:rPr lang="fr-FR" smtClean="0"/>
-              <a:t>07/09/15</a:t>
+              <a:t>17/09/15</a:t>
             </a:fld>
             <a:endParaRPr lang="fr-FR" dirty="0"/>
           </a:p>
@@ -7418,7 +7414,7 @@
           <a:p>
             <a:fld id="{90F72DDC-563B-C341-83C2-E73D8B258BF3}" type="datetime1">
               <a:rPr lang="fr-FR" smtClean="0"/>
-              <a:t>07/09/15</a:t>
+              <a:t>17/09/15</a:t>
             </a:fld>
             <a:endParaRPr lang="fr-FR" dirty="0"/>
           </a:p>
@@ -8626,7 +8622,6 @@
               <a:rPr lang="fr-FR" sz="2000" dirty="0" smtClean="0"/>
               <a:t>.</a:t>
             </a:r>
-            <a:endParaRPr lang="fr-FR" sz="2000" dirty="0" smtClean="0"/>
           </a:p>
           <a:p>
             <a:pPr marL="0" indent="0" algn="just">
@@ -8725,7 +8720,7 @@
           <a:p>
             <a:fld id="{19038BA7-713C-2544-8829-1AE6272C1240}" type="datetime1">
               <a:rPr lang="fr-FR" smtClean="0"/>
-              <a:t>07/09/15</a:t>
+              <a:t>17/09/15</a:t>
             </a:fld>
             <a:endParaRPr lang="fr-FR" dirty="0"/>
           </a:p>
@@ -8970,7 +8965,7 @@
           <a:p>
             <a:fld id="{19038BA7-713C-2544-8829-1AE6272C1240}" type="datetime1">
               <a:rPr lang="fr-FR" smtClean="0"/>
-              <a:t>07/09/15</a:t>
+              <a:t>17/09/15</a:t>
             </a:fld>
             <a:endParaRPr lang="fr-FR" dirty="0"/>
           </a:p>
@@ -9239,7 +9234,7 @@
           <a:p>
             <a:fld id="{19038BA7-713C-2544-8829-1AE6272C1240}" type="datetime1">
               <a:rPr lang="fr-FR" smtClean="0"/>
-              <a:t>07/09/15</a:t>
+              <a:t>17/09/15</a:t>
             </a:fld>
             <a:endParaRPr lang="fr-FR" dirty="0"/>
           </a:p>
@@ -9563,7 +9558,7 @@
           <a:p>
             <a:fld id="{90F72DDC-563B-C341-83C2-E73D8B258BF3}" type="datetime1">
               <a:rPr lang="fr-FR" smtClean="0"/>
-              <a:t>07/09/15</a:t>
+              <a:t>17/09/15</a:t>
             </a:fld>
             <a:endParaRPr lang="fr-FR" dirty="0"/>
           </a:p>
@@ -9779,7 +9774,7 @@
           <a:p>
             <a:fld id="{19038BA7-713C-2544-8829-1AE6272C1240}" type="datetime1">
               <a:rPr lang="fr-FR" smtClean="0"/>
-              <a:t>07/09/15</a:t>
+              <a:t>17/09/15</a:t>
             </a:fld>
             <a:endParaRPr lang="fr-FR" dirty="0"/>
           </a:p>
@@ -10160,7 +10155,7 @@
           <a:p>
             <a:fld id="{90F72DDC-563B-C341-83C2-E73D8B258BF3}" type="datetime1">
               <a:rPr lang="fr-FR" smtClean="0"/>
-              <a:t>07/09/15</a:t>
+              <a:t>17/09/15</a:t>
             </a:fld>
             <a:endParaRPr lang="fr-FR" dirty="0"/>
           </a:p>
@@ -10384,7 +10379,7 @@
           <a:p>
             <a:fld id="{19038BA7-713C-2544-8829-1AE6272C1240}" type="datetime1">
               <a:rPr lang="fr-FR" smtClean="0"/>
-              <a:t>07/09/15</a:t>
+              <a:t>17/09/15</a:t>
             </a:fld>
             <a:endParaRPr lang="fr-FR" dirty="0"/>
           </a:p>
@@ -10750,7 +10745,7 @@
           <a:p>
             <a:fld id="{90F72DDC-563B-C341-83C2-E73D8B258BF3}" type="datetime1">
               <a:rPr lang="fr-FR" smtClean="0"/>
-              <a:t>07/09/15</a:t>
+              <a:t>17/09/15</a:t>
             </a:fld>
             <a:endParaRPr lang="fr-FR" dirty="0"/>
           </a:p>
@@ -10974,7 +10969,7 @@
           <a:p>
             <a:fld id="{19038BA7-713C-2544-8829-1AE6272C1240}" type="datetime1">
               <a:rPr lang="fr-FR" smtClean="0"/>
-              <a:t>07/09/15</a:t>
+              <a:t>17/09/15</a:t>
             </a:fld>
             <a:endParaRPr lang="fr-FR" dirty="0"/>
           </a:p>
@@ -11377,7 +11372,7 @@
           <a:p>
             <a:fld id="{90F72DDC-563B-C341-83C2-E73D8B258BF3}" type="datetime1">
               <a:rPr lang="fr-FR" smtClean="0"/>
-              <a:t>07/09/15</a:t>
+              <a:t>17/09/15</a:t>
             </a:fld>
             <a:endParaRPr lang="fr-FR" dirty="0"/>
           </a:p>
@@ -11606,7 +11601,7 @@
           <a:p>
             <a:fld id="{19038BA7-713C-2544-8829-1AE6272C1240}" type="datetime1">
               <a:rPr lang="fr-FR" smtClean="0"/>
-              <a:t>07/09/15</a:t>
+              <a:t>17/09/15</a:t>
             </a:fld>
             <a:endParaRPr lang="fr-FR" dirty="0"/>
           </a:p>
@@ -11950,7 +11945,7 @@
           <a:p>
             <a:fld id="{19038BA7-713C-2544-8829-1AE6272C1240}" type="datetime1">
               <a:rPr lang="fr-FR" smtClean="0"/>
-              <a:t>07/09/15</a:t>
+              <a:t>17/09/15</a:t>
             </a:fld>
             <a:endParaRPr lang="fr-FR" dirty="0"/>
           </a:p>
@@ -12182,7 +12177,7 @@
           <a:p>
             <a:fld id="{90F72DDC-563B-C341-83C2-E73D8B258BF3}" type="datetime1">
               <a:rPr lang="fr-FR" smtClean="0"/>
-              <a:t>07/09/15</a:t>
+              <a:t>17/09/15</a:t>
             </a:fld>
             <a:endParaRPr lang="fr-FR" dirty="0"/>
           </a:p>
@@ -12423,7 +12418,7 @@
           <a:p>
             <a:fld id="{19038BA7-713C-2544-8829-1AE6272C1240}" type="datetime1">
               <a:rPr lang="fr-FR" smtClean="0"/>
-              <a:t>07/09/15</a:t>
+              <a:t>17/09/15</a:t>
             </a:fld>
             <a:endParaRPr lang="fr-FR" dirty="0"/>
           </a:p>
@@ -12880,7 +12875,7 @@
           <a:p>
             <a:fld id="{90F72DDC-563B-C341-83C2-E73D8B258BF3}" type="datetime1">
               <a:rPr lang="fr-FR" smtClean="0"/>
-              <a:t>07/09/15</a:t>
+              <a:t>17/09/15</a:t>
             </a:fld>
             <a:endParaRPr lang="fr-FR" dirty="0"/>
           </a:p>
@@ -13088,7 +13083,7 @@
           <a:p>
             <a:fld id="{19038BA7-713C-2544-8829-1AE6272C1240}" type="datetime1">
               <a:rPr lang="fr-FR" smtClean="0"/>
-              <a:t>07/09/15</a:t>
+              <a:t>17/09/15</a:t>
             </a:fld>
             <a:endParaRPr lang="fr-FR" dirty="0"/>
           </a:p>
@@ -13523,7 +13518,7 @@
           <a:p>
             <a:fld id="{90F72DDC-563B-C341-83C2-E73D8B258BF3}" type="datetime1">
               <a:rPr lang="fr-FR" smtClean="0"/>
-              <a:t>07/09/15</a:t>
+              <a:t>17/09/15</a:t>
             </a:fld>
             <a:endParaRPr lang="fr-FR" dirty="0"/>
           </a:p>
@@ -13746,7 +13741,7 @@
           <a:p>
             <a:fld id="{90F72DDC-563B-C341-83C2-E73D8B258BF3}" type="datetime1">
               <a:rPr lang="fr-FR" smtClean="0"/>
-              <a:t>07/09/15</a:t>
+              <a:t>17/09/15</a:t>
             </a:fld>
             <a:endParaRPr lang="fr-FR" dirty="0"/>
           </a:p>
@@ -13953,7 +13948,7 @@
           <a:p>
             <a:fld id="{90F72DDC-563B-C341-83C2-E73D8B258BF3}" type="datetime1">
               <a:rPr lang="fr-FR" smtClean="0"/>
-              <a:t>07/09/15</a:t>
+              <a:t>17/09/15</a:t>
             </a:fld>
             <a:endParaRPr lang="fr-FR" dirty="0"/>
           </a:p>
@@ -14138,7 +14133,7 @@
           <a:p>
             <a:fld id="{90F72DDC-563B-C341-83C2-E73D8B258BF3}" type="datetime1">
               <a:rPr lang="fr-FR" smtClean="0"/>
-              <a:t>07/09/15</a:t>
+              <a:t>17/09/15</a:t>
             </a:fld>
             <a:endParaRPr lang="fr-FR" dirty="0"/>
           </a:p>
@@ -14354,7 +14349,7 @@
           <a:p>
             <a:fld id="{90F72DDC-563B-C341-83C2-E73D8B258BF3}" type="datetime1">
               <a:rPr lang="fr-FR" smtClean="0"/>
-              <a:t>07/09/15</a:t>
+              <a:t>17/09/15</a:t>
             </a:fld>
             <a:endParaRPr lang="fr-FR" dirty="0"/>
           </a:p>
@@ -14624,7 +14619,7 @@
           <a:p>
             <a:fld id="{90F72DDC-563B-C341-83C2-E73D8B258BF3}" type="datetime1">
               <a:rPr lang="fr-FR" smtClean="0"/>
-              <a:t>07/09/15</a:t>
+              <a:t>17/09/15</a:t>
             </a:fld>
             <a:endParaRPr lang="fr-FR" dirty="0"/>
           </a:p>
@@ -14824,7 +14819,7 @@
           <a:p>
             <a:fld id="{19038BA7-713C-2544-8829-1AE6272C1240}" type="datetime1">
               <a:rPr lang="fr-FR" smtClean="0"/>
-              <a:t>07/09/15</a:t>
+              <a:t>17/09/15</a:t>
             </a:fld>
             <a:endParaRPr lang="fr-FR" dirty="0"/>
           </a:p>
@@ -15046,7 +15041,7 @@
           <a:p>
             <a:fld id="{90F72DDC-563B-C341-83C2-E73D8B258BF3}" type="datetime1">
               <a:rPr lang="fr-FR" smtClean="0"/>
-              <a:t>07/09/15</a:t>
+              <a:t>17/09/15</a:t>
             </a:fld>
             <a:endParaRPr lang="fr-FR" dirty="0"/>
           </a:p>
@@ -15191,7 +15186,7 @@
           <a:p>
             <a:fld id="{19038BA7-713C-2544-8829-1AE6272C1240}" type="datetime1">
               <a:rPr lang="fr-FR" smtClean="0"/>
-              <a:t>07/09/15</a:t>
+              <a:t>17/09/15</a:t>
             </a:fld>
             <a:endParaRPr lang="fr-FR" dirty="0"/>
           </a:p>
@@ -15336,7 +15331,7 @@
           <a:p>
             <a:fld id="{19038BA7-713C-2544-8829-1AE6272C1240}" type="datetime1">
               <a:rPr lang="fr-FR" smtClean="0"/>
-              <a:t>07/09/15</a:t>
+              <a:t>17/09/15</a:t>
             </a:fld>
             <a:endParaRPr lang="fr-FR" dirty="0"/>
           </a:p>
@@ -15589,7 +15584,7 @@
           <a:p>
             <a:fld id="{213233DE-E2B7-914A-A9A2-B94007DE19EE}" type="datetime1">
               <a:rPr lang="fr-FR" smtClean="0"/>
-              <a:t>07/09/15</a:t>
+              <a:t>17/09/15</a:t>
             </a:fld>
             <a:endParaRPr lang="fr-FR" dirty="0"/>
           </a:p>
@@ -15831,7 +15826,7 @@
           <a:p>
             <a:fld id="{90F72DDC-563B-C341-83C2-E73D8B258BF3}" type="datetime1">
               <a:rPr lang="fr-FR" smtClean="0"/>
-              <a:t>07/09/15</a:t>
+              <a:t>17/09/15</a:t>
             </a:fld>
             <a:endParaRPr lang="fr-FR" dirty="0"/>
           </a:p>
@@ -16100,7 +16095,7 @@
           <a:p>
             <a:fld id="{90F72DDC-563B-C341-83C2-E73D8B258BF3}" type="datetime1">
               <a:rPr lang="fr-FR" smtClean="0"/>
-              <a:t>07/09/15</a:t>
+              <a:t>17/09/15</a:t>
             </a:fld>
             <a:endParaRPr lang="fr-FR" dirty="0"/>
           </a:p>
@@ -16300,7 +16295,7 @@
           <a:p>
             <a:fld id="{213233DE-E2B7-914A-A9A2-B94007DE19EE}" type="datetime1">
               <a:rPr lang="fr-FR" smtClean="0"/>
-              <a:t>07/09/15</a:t>
+              <a:t>17/09/15</a:t>
             </a:fld>
             <a:endParaRPr lang="fr-FR" dirty="0"/>
           </a:p>
@@ -16592,7 +16587,7 @@
           <a:p>
             <a:fld id="{213233DE-E2B7-914A-A9A2-B94007DE19EE}" type="datetime1">
               <a:rPr lang="fr-FR" smtClean="0"/>
-              <a:t>07/09/15</a:t>
+              <a:t>17/09/15</a:t>
             </a:fld>
             <a:endParaRPr lang="fr-FR" dirty="0"/>
           </a:p>
@@ -16761,7 +16756,7 @@
           <a:p>
             <a:fld id="{19038BA7-713C-2544-8829-1AE6272C1240}" type="datetime1">
               <a:rPr lang="fr-FR" smtClean="0"/>
-              <a:t>07/09/15</a:t>
+              <a:t>17/09/15</a:t>
             </a:fld>
             <a:endParaRPr lang="fr-FR" dirty="0"/>
           </a:p>
@@ -16880,7 +16875,7 @@
           <a:p>
             <a:fld id="{213233DE-E2B7-914A-A9A2-B94007DE19EE}" type="datetime1">
               <a:rPr lang="fr-FR" smtClean="0"/>
-              <a:t>07/09/15</a:t>
+              <a:t>17/09/15</a:t>
             </a:fld>
             <a:endParaRPr lang="fr-FR" dirty="0"/>
           </a:p>
@@ -17080,7 +17075,7 @@
           <a:p>
             <a:fld id="{19038BA7-713C-2544-8829-1AE6272C1240}" type="datetime1">
               <a:rPr lang="fr-FR" smtClean="0"/>
-              <a:t>07/09/15</a:t>
+              <a:t>17/09/15</a:t>
             </a:fld>
             <a:endParaRPr lang="fr-FR" dirty="0"/>
           </a:p>
@@ -17253,7 +17248,7 @@
           <a:p>
             <a:fld id="{213233DE-E2B7-914A-A9A2-B94007DE19EE}" type="datetime1">
               <a:rPr lang="fr-FR" smtClean="0"/>
-              <a:t>07/09/15</a:t>
+              <a:t>17/09/15</a:t>
             </a:fld>
             <a:endParaRPr lang="fr-FR" dirty="0"/>
           </a:p>
@@ -17444,7 +17439,7 @@
           <a:p>
             <a:fld id="{213233DE-E2B7-914A-A9A2-B94007DE19EE}" type="datetime1">
               <a:rPr lang="fr-FR" smtClean="0"/>
-              <a:t>07/09/15</a:t>
+              <a:t>17/09/15</a:t>
             </a:fld>
             <a:endParaRPr lang="fr-FR" dirty="0"/>
           </a:p>
@@ -17662,7 +17657,7 @@
           <a:p>
             <a:fld id="{213233DE-E2B7-914A-A9A2-B94007DE19EE}" type="datetime1">
               <a:rPr lang="fr-FR" smtClean="0"/>
-              <a:t>07/09/15</a:t>
+              <a:t>17/09/15</a:t>
             </a:fld>
             <a:endParaRPr lang="fr-FR" dirty="0"/>
           </a:p>
@@ -17930,7 +17925,7 @@
           <a:p>
             <a:fld id="{213233DE-E2B7-914A-A9A2-B94007DE19EE}" type="datetime1">
               <a:rPr lang="fr-FR" smtClean="0"/>
-              <a:t>07/09/15</a:t>
+              <a:t>17/09/15</a:t>
             </a:fld>
             <a:endParaRPr lang="fr-FR" dirty="0"/>
           </a:p>
@@ -18252,7 +18247,7 @@
           <a:p>
             <a:fld id="{213233DE-E2B7-914A-A9A2-B94007DE19EE}" type="datetime1">
               <a:rPr lang="fr-FR" smtClean="0"/>
-              <a:t>07/09/15</a:t>
+              <a:t>17/09/15</a:t>
             </a:fld>
             <a:endParaRPr lang="fr-FR" dirty="0"/>
           </a:p>
@@ -18537,7 +18532,7 @@
           <a:p>
             <a:fld id="{213233DE-E2B7-914A-A9A2-B94007DE19EE}" type="datetime1">
               <a:rPr lang="fr-FR" smtClean="0"/>
-              <a:t>07/09/15</a:t>
+              <a:t>17/09/15</a:t>
             </a:fld>
             <a:endParaRPr lang="fr-FR" dirty="0"/>
           </a:p>
@@ -18784,7 +18779,7 @@
           <a:p>
             <a:fld id="{C42B5CCB-00AF-494F-BB8F-8549A9D97B0C}" type="datetime1">
               <a:rPr lang="fr-FR" smtClean="0"/>
-              <a:t>07/09/15</a:t>
+              <a:t>17/09/15</a:t>
             </a:fld>
             <a:endParaRPr lang="fr-FR" dirty="0"/>
           </a:p>
@@ -19008,7 +19003,7 @@
           <a:p>
             <a:fld id="{C42B5CCB-00AF-494F-BB8F-8549A9D97B0C}" type="datetime1">
               <a:rPr lang="fr-FR" smtClean="0"/>
-              <a:t>07/09/15</a:t>
+              <a:t>17/09/15</a:t>
             </a:fld>
             <a:endParaRPr lang="fr-FR" dirty="0"/>
           </a:p>
@@ -19247,7 +19242,7 @@
           <a:p>
             <a:fld id="{C42B5CCB-00AF-494F-BB8F-8549A9D97B0C}" type="datetime1">
               <a:rPr lang="fr-FR" smtClean="0"/>
-              <a:t>07/09/15</a:t>
+              <a:t>17/09/15</a:t>
             </a:fld>
             <a:endParaRPr lang="fr-FR" dirty="0"/>
           </a:p>
@@ -19471,7 +19466,7 @@
           <a:p>
             <a:fld id="{C42B5CCB-00AF-494F-BB8F-8549A9D97B0C}" type="datetime1">
               <a:rPr lang="fr-FR" smtClean="0"/>
-              <a:t>07/09/15</a:t>
+              <a:t>17/09/15</a:t>
             </a:fld>
             <a:endParaRPr lang="fr-FR" dirty="0"/>
           </a:p>
@@ -19837,7 +19832,7 @@
           <a:p>
             <a:fld id="{19038BA7-713C-2544-8829-1AE6272C1240}" type="datetime1">
               <a:rPr lang="fr-FR" smtClean="0"/>
-              <a:t>07/09/15</a:t>
+              <a:t>17/09/15</a:t>
             </a:fld>
             <a:endParaRPr lang="fr-FR" dirty="0"/>
           </a:p>
@@ -19956,7 +19951,7 @@
           <a:p>
             <a:fld id="{C42B5CCB-00AF-494F-BB8F-8549A9D97B0C}" type="datetime1">
               <a:rPr lang="fr-FR" smtClean="0"/>
-              <a:t>07/09/15</a:t>
+              <a:t>17/09/15</a:t>
             </a:fld>
             <a:endParaRPr lang="fr-FR" dirty="0"/>
           </a:p>
@@ -20186,7 +20181,7 @@
           <a:p>
             <a:fld id="{D982A0D6-A7C2-DA44-8C91-0D82881601ED}" type="datetime1">
               <a:rPr lang="fr-FR" smtClean="0"/>
-              <a:t>07/09/15</a:t>
+              <a:t>17/09/15</a:t>
             </a:fld>
             <a:endParaRPr lang="fr-FR" dirty="0"/>
           </a:p>
@@ -20444,7 +20439,7 @@
           <a:p>
             <a:fld id="{19038BA7-713C-2544-8829-1AE6272C1240}" type="datetime1">
               <a:rPr lang="fr-FR" smtClean="0"/>
-              <a:t>07/09/15</a:t>
+              <a:t>17/09/15</a:t>
             </a:fld>
             <a:endParaRPr lang="fr-FR" dirty="0"/>
           </a:p>
@@ -20454,603 +20449,6 @@
     <p:extLst>
       <p:ext uri="{BB962C8B-B14F-4D97-AF65-F5344CB8AC3E}">
         <p14:creationId xmlns:p14="http://schemas.microsoft.com/office/powerpoint/2010/main" val="2498271283"/>
-      </p:ext>
-    </p:extLst>
-  </p:cSld>
-  <p:clrMapOvr>
-    <a:masterClrMapping/>
-  </p:clrMapOvr>
-</p:sld>
-</file>
-
-<file path=ppt/slides/slide63.xml><?xml version="1.0" encoding="utf-8"?>
-<p:sld xmlns:a="http://schemas.openxmlformats.org/drawingml/2006/main" xmlns:r="http://schemas.openxmlformats.org/officeDocument/2006/relationships" xmlns:p="http://schemas.openxmlformats.org/presentationml/2006/main">
-  <p:cSld>
-    <p:spTree>
-      <p:nvGrpSpPr>
-        <p:cNvPr id="1" name=""/>
-        <p:cNvGrpSpPr/>
-        <p:nvPr/>
-      </p:nvGrpSpPr>
-      <p:grpSpPr>
-        <a:xfrm>
-          <a:off x="0" y="0"/>
-          <a:ext cx="0" cy="0"/>
-          <a:chOff x="0" y="0"/>
-          <a:chExt cx="0" cy="0"/>
-        </a:xfrm>
-      </p:grpSpPr>
-      <p:sp>
-        <p:nvSpPr>
-          <p:cNvPr id="2" name="Titre 1"/>
-          <p:cNvSpPr>
-            <a:spLocks noGrp="1"/>
-          </p:cNvSpPr>
-          <p:nvPr>
-            <p:ph type="title"/>
-          </p:nvPr>
-        </p:nvSpPr>
-        <p:spPr/>
-        <p:txBody>
-          <a:bodyPr/>
-          <a:lstStyle/>
-          <a:p>
-            <a:endParaRPr lang="fr-FR"/>
-          </a:p>
-        </p:txBody>
-      </p:sp>
-      <p:sp>
-        <p:nvSpPr>
-          <p:cNvPr id="3" name="Espace réservé du contenu 2"/>
-          <p:cNvSpPr>
-            <a:spLocks noGrp="1"/>
-          </p:cNvSpPr>
-          <p:nvPr>
-            <p:ph idx="1"/>
-          </p:nvPr>
-        </p:nvSpPr>
-        <p:spPr/>
-        <p:txBody>
-          <a:bodyPr anchor="ctr"/>
-          <a:lstStyle/>
-          <a:p>
-            <a:pPr marL="0" indent="0" algn="ctr">
-              <a:buNone/>
-            </a:pPr>
-            <a:r>
-              <a:rPr lang="fr-FR" dirty="0" smtClean="0"/>
-              <a:t>GIT</a:t>
-            </a:r>
-            <a:endParaRPr lang="fr-FR" dirty="0"/>
-          </a:p>
-        </p:txBody>
-      </p:sp>
-      <p:sp>
-        <p:nvSpPr>
-          <p:cNvPr id="4" name="Espace réservé du pied de page 3"/>
-          <p:cNvSpPr>
-            <a:spLocks noGrp="1"/>
-          </p:cNvSpPr>
-          <p:nvPr>
-            <p:ph type="ftr" sz="quarter" idx="3"/>
-          </p:nvPr>
-        </p:nvSpPr>
-        <p:spPr/>
-        <p:txBody>
-          <a:bodyPr/>
-          <a:lstStyle/>
-          <a:p>
-            <a:r>
-              <a:rPr lang="fr-FR" dirty="0" smtClean="0"/>
-              <a:t>Rémi Ronfard - GMIN317 – API RENDU 1</a:t>
-            </a:r>
-            <a:endParaRPr lang="fr-FR" b="1" dirty="0"/>
-          </a:p>
-        </p:txBody>
-      </p:sp>
-      <p:sp>
-        <p:nvSpPr>
-          <p:cNvPr id="5" name="Espace réservé du numéro de diapositive 4"/>
-          <p:cNvSpPr>
-            <a:spLocks noGrp="1"/>
-          </p:cNvSpPr>
-          <p:nvPr>
-            <p:ph type="sldNum" sz="quarter" idx="4"/>
-          </p:nvPr>
-        </p:nvSpPr>
-        <p:spPr/>
-        <p:txBody>
-          <a:bodyPr/>
-          <a:lstStyle/>
-          <a:p>
-            <a:fld id="{A6C87E8C-A1B1-CC4A-8C89-9A370644B80A}" type="slidenum">
-              <a:rPr lang="fr-FR" smtClean="0"/>
-              <a:pPr/>
-              <a:t>63</a:t>
-            </a:fld>
-            <a:endParaRPr lang="fr-FR" dirty="0"/>
-          </a:p>
-        </p:txBody>
-      </p:sp>
-      <p:sp>
-        <p:nvSpPr>
-          <p:cNvPr id="6" name="Espace réservé de la date 5"/>
-          <p:cNvSpPr>
-            <a:spLocks noGrp="1"/>
-          </p:cNvSpPr>
-          <p:nvPr>
-            <p:ph type="dt" sz="half" idx="2"/>
-          </p:nvPr>
-        </p:nvSpPr>
-        <p:spPr/>
-        <p:txBody>
-          <a:bodyPr/>
-          <a:lstStyle/>
-          <a:p>
-            <a:fld id="{3D85F28E-A20A-254E-B4B9-91D136105DD0}" type="datetime1">
-              <a:rPr lang="fr-FR" smtClean="0"/>
-              <a:t>07/09/15</a:t>
-            </a:fld>
-            <a:endParaRPr lang="fr-FR" dirty="0"/>
-          </a:p>
-        </p:txBody>
-      </p:sp>
-    </p:spTree>
-    <p:extLst>
-      <p:ext uri="{BB962C8B-B14F-4D97-AF65-F5344CB8AC3E}">
-        <p14:creationId xmlns:p14="http://schemas.microsoft.com/office/powerpoint/2010/main" val="3110299953"/>
-      </p:ext>
-    </p:extLst>
-  </p:cSld>
-  <p:clrMapOvr>
-    <a:masterClrMapping/>
-  </p:clrMapOvr>
-</p:sld>
-</file>
-
-<file path=ppt/slides/slide64.xml><?xml version="1.0" encoding="utf-8"?>
-<p:sld xmlns:a="http://schemas.openxmlformats.org/drawingml/2006/main" xmlns:r="http://schemas.openxmlformats.org/officeDocument/2006/relationships" xmlns:p="http://schemas.openxmlformats.org/presentationml/2006/main">
-  <p:cSld>
-    <p:spTree>
-      <p:nvGrpSpPr>
-        <p:cNvPr id="1" name=""/>
-        <p:cNvGrpSpPr/>
-        <p:nvPr/>
-      </p:nvGrpSpPr>
-      <p:grpSpPr>
-        <a:xfrm>
-          <a:off x="0" y="0"/>
-          <a:ext cx="0" cy="0"/>
-          <a:chOff x="0" y="0"/>
-          <a:chExt cx="0" cy="0"/>
-        </a:xfrm>
-      </p:grpSpPr>
-      <p:sp>
-        <p:nvSpPr>
-          <p:cNvPr id="2" name="Titre 1"/>
-          <p:cNvSpPr>
-            <a:spLocks noGrp="1"/>
-          </p:cNvSpPr>
-          <p:nvPr>
-            <p:ph type="title"/>
-          </p:nvPr>
-        </p:nvSpPr>
-        <p:spPr/>
-        <p:txBody>
-          <a:bodyPr/>
-          <a:lstStyle/>
-          <a:p>
-            <a:endParaRPr lang="fr-FR"/>
-          </a:p>
-        </p:txBody>
-      </p:sp>
-      <p:sp>
-        <p:nvSpPr>
-          <p:cNvPr id="3" name="Espace réservé du contenu 2"/>
-          <p:cNvSpPr>
-            <a:spLocks noGrp="1"/>
-          </p:cNvSpPr>
-          <p:nvPr>
-            <p:ph idx="1"/>
-          </p:nvPr>
-        </p:nvSpPr>
-        <p:spPr/>
-        <p:txBody>
-          <a:bodyPr anchor="ctr"/>
-          <a:lstStyle/>
-          <a:p>
-            <a:pPr marL="0" indent="0" algn="ctr">
-              <a:buNone/>
-            </a:pPr>
-            <a:r>
-              <a:rPr lang="fr-FR" dirty="0" smtClean="0"/>
-              <a:t>Mini-projets</a:t>
-            </a:r>
-            <a:endParaRPr lang="fr-FR" dirty="0"/>
-          </a:p>
-        </p:txBody>
-      </p:sp>
-      <p:sp>
-        <p:nvSpPr>
-          <p:cNvPr id="4" name="Espace réservé du pied de page 3"/>
-          <p:cNvSpPr>
-            <a:spLocks noGrp="1"/>
-          </p:cNvSpPr>
-          <p:nvPr>
-            <p:ph type="ftr" sz="quarter" idx="3"/>
-          </p:nvPr>
-        </p:nvSpPr>
-        <p:spPr/>
-        <p:txBody>
-          <a:bodyPr/>
-          <a:lstStyle/>
-          <a:p>
-            <a:r>
-              <a:rPr lang="fr-FR" dirty="0" smtClean="0"/>
-              <a:t>Rémi Ronfard - GMIN317 – API RENDU 1</a:t>
-            </a:r>
-            <a:endParaRPr lang="fr-FR" b="1" dirty="0"/>
-          </a:p>
-        </p:txBody>
-      </p:sp>
-      <p:sp>
-        <p:nvSpPr>
-          <p:cNvPr id="5" name="Espace réservé du numéro de diapositive 4"/>
-          <p:cNvSpPr>
-            <a:spLocks noGrp="1"/>
-          </p:cNvSpPr>
-          <p:nvPr>
-            <p:ph type="sldNum" sz="quarter" idx="4"/>
-          </p:nvPr>
-        </p:nvSpPr>
-        <p:spPr/>
-        <p:txBody>
-          <a:bodyPr/>
-          <a:lstStyle/>
-          <a:p>
-            <a:fld id="{A6C87E8C-A1B1-CC4A-8C89-9A370644B80A}" type="slidenum">
-              <a:rPr lang="fr-FR" smtClean="0"/>
-              <a:pPr/>
-              <a:t>64</a:t>
-            </a:fld>
-            <a:endParaRPr lang="fr-FR" dirty="0"/>
-          </a:p>
-        </p:txBody>
-      </p:sp>
-      <p:sp>
-        <p:nvSpPr>
-          <p:cNvPr id="6" name="Espace réservé de la date 5"/>
-          <p:cNvSpPr>
-            <a:spLocks noGrp="1"/>
-          </p:cNvSpPr>
-          <p:nvPr>
-            <p:ph type="dt" sz="half" idx="2"/>
-          </p:nvPr>
-        </p:nvSpPr>
-        <p:spPr/>
-        <p:txBody>
-          <a:bodyPr/>
-          <a:lstStyle/>
-          <a:p>
-            <a:fld id="{3D85F28E-A20A-254E-B4B9-91D136105DD0}" type="datetime1">
-              <a:rPr lang="fr-FR" smtClean="0"/>
-              <a:t>07/09/15</a:t>
-            </a:fld>
-            <a:endParaRPr lang="fr-FR" dirty="0"/>
-          </a:p>
-        </p:txBody>
-      </p:sp>
-    </p:spTree>
-    <p:extLst>
-      <p:ext uri="{BB962C8B-B14F-4D97-AF65-F5344CB8AC3E}">
-        <p14:creationId xmlns:p14="http://schemas.microsoft.com/office/powerpoint/2010/main" val="2457279436"/>
-      </p:ext>
-    </p:extLst>
-  </p:cSld>
-  <p:clrMapOvr>
-    <a:masterClrMapping/>
-  </p:clrMapOvr>
-</p:sld>
-</file>
-
-<file path=ppt/slides/slide65.xml><?xml version="1.0" encoding="utf-8"?>
-<p:sld xmlns:a="http://schemas.openxmlformats.org/drawingml/2006/main" xmlns:r="http://schemas.openxmlformats.org/officeDocument/2006/relationships" xmlns:p="http://schemas.openxmlformats.org/presentationml/2006/main">
-  <p:cSld>
-    <p:spTree>
-      <p:nvGrpSpPr>
-        <p:cNvPr id="1" name=""/>
-        <p:cNvGrpSpPr/>
-        <p:nvPr/>
-      </p:nvGrpSpPr>
-      <p:grpSpPr>
-        <a:xfrm>
-          <a:off x="0" y="0"/>
-          <a:ext cx="0" cy="0"/>
-          <a:chOff x="0" y="0"/>
-          <a:chExt cx="0" cy="0"/>
-        </a:xfrm>
-      </p:grpSpPr>
-      <p:sp>
-        <p:nvSpPr>
-          <p:cNvPr id="2" name="Titre 1"/>
-          <p:cNvSpPr>
-            <a:spLocks noGrp="1"/>
-          </p:cNvSpPr>
-          <p:nvPr>
-            <p:ph type="title"/>
-          </p:nvPr>
-        </p:nvSpPr>
-        <p:spPr/>
-        <p:txBody>
-          <a:bodyPr/>
-          <a:lstStyle/>
-          <a:p>
-            <a:endParaRPr lang="fr-FR"/>
-          </a:p>
-        </p:txBody>
-      </p:sp>
-      <p:sp>
-        <p:nvSpPr>
-          <p:cNvPr id="3" name="Espace réservé du contenu 2"/>
-          <p:cNvSpPr>
-            <a:spLocks noGrp="1"/>
-          </p:cNvSpPr>
-          <p:nvPr>
-            <p:ph idx="1"/>
-          </p:nvPr>
-        </p:nvSpPr>
-        <p:spPr/>
-        <p:txBody>
-          <a:bodyPr/>
-          <a:lstStyle/>
-          <a:p>
-            <a:r>
-              <a:rPr lang="fr-FR" dirty="0" smtClean="0"/>
-              <a:t>Et ….</a:t>
-            </a:r>
-          </a:p>
-          <a:p>
-            <a:r>
-              <a:rPr lang="fr-FR" dirty="0" smtClean="0"/>
-              <a:t>Maintenant …</a:t>
-            </a:r>
-          </a:p>
-          <a:p>
-            <a:endParaRPr lang="fr-FR" dirty="0"/>
-          </a:p>
-          <a:p>
-            <a:endParaRPr lang="fr-FR" dirty="0" smtClean="0"/>
-          </a:p>
-          <a:p>
-            <a:r>
-              <a:rPr lang="fr-FR" dirty="0" smtClean="0"/>
-              <a:t>Vous pouvez réaliser votre dernier commit pour le TP précédent.</a:t>
-            </a:r>
-          </a:p>
-          <a:p>
-            <a:endParaRPr lang="fr-FR" dirty="0"/>
-          </a:p>
-        </p:txBody>
-      </p:sp>
-      <p:sp>
-        <p:nvSpPr>
-          <p:cNvPr id="4" name="Espace réservé du numéro de diapositive 3"/>
-          <p:cNvSpPr>
-            <a:spLocks noGrp="1"/>
-          </p:cNvSpPr>
-          <p:nvPr>
-            <p:ph type="sldNum" sz="quarter" idx="4"/>
-          </p:nvPr>
-        </p:nvSpPr>
-        <p:spPr/>
-        <p:txBody>
-          <a:bodyPr/>
-          <a:lstStyle/>
-          <a:p>
-            <a:fld id="{A6C87E8C-A1B1-CC4A-8C89-9A370644B80A}" type="slidenum">
-              <a:rPr lang="fr-FR" smtClean="0"/>
-              <a:pPr/>
-              <a:t>65</a:t>
-            </a:fld>
-            <a:endParaRPr lang="fr-FR" dirty="0"/>
-          </a:p>
-        </p:txBody>
-      </p:sp>
-      <p:sp>
-        <p:nvSpPr>
-          <p:cNvPr id="5" name="Espace réservé de la date 4"/>
-          <p:cNvSpPr>
-            <a:spLocks noGrp="1"/>
-          </p:cNvSpPr>
-          <p:nvPr>
-            <p:ph type="dt" sz="half" idx="2"/>
-          </p:nvPr>
-        </p:nvSpPr>
-        <p:spPr/>
-        <p:txBody>
-          <a:bodyPr/>
-          <a:lstStyle/>
-          <a:p>
-            <a:fld id="{91CF72A9-D654-5444-8857-3FC1397800DA}" type="datetime1">
-              <a:rPr lang="fr-FR" smtClean="0"/>
-              <a:t>07/09/15</a:t>
-            </a:fld>
-            <a:endParaRPr lang="fr-FR" dirty="0"/>
-          </a:p>
-        </p:txBody>
-      </p:sp>
-      <p:sp>
-        <p:nvSpPr>
-          <p:cNvPr id="6" name="Espace réservé du pied de page 5"/>
-          <p:cNvSpPr>
-            <a:spLocks noGrp="1"/>
-          </p:cNvSpPr>
-          <p:nvPr>
-            <p:ph type="ftr" sz="quarter" idx="3"/>
-          </p:nvPr>
-        </p:nvSpPr>
-        <p:spPr/>
-        <p:txBody>
-          <a:bodyPr/>
-          <a:lstStyle/>
-          <a:p>
-            <a:r>
-              <a:rPr lang="fr-FR" smtClean="0"/>
-              <a:t>Benoit Lange – benoit@lange.xyz – GMIN317 – Game Engine 2  </a:t>
-            </a:r>
-            <a:endParaRPr lang="fr-FR" b="1" dirty="0"/>
-          </a:p>
-        </p:txBody>
-      </p:sp>
-    </p:spTree>
-    <p:extLst>
-      <p:ext uri="{BB962C8B-B14F-4D97-AF65-F5344CB8AC3E}">
-        <p14:creationId xmlns:p14="http://schemas.microsoft.com/office/powerpoint/2010/main" val="1087685455"/>
-      </p:ext>
-    </p:extLst>
-  </p:cSld>
-  <p:clrMapOvr>
-    <a:masterClrMapping/>
-  </p:clrMapOvr>
-</p:sld>
-</file>
-
-<file path=ppt/slides/slide66.xml><?xml version="1.0" encoding="utf-8"?>
-<p:sld xmlns:a="http://schemas.openxmlformats.org/drawingml/2006/main" xmlns:r="http://schemas.openxmlformats.org/officeDocument/2006/relationships" xmlns:p="http://schemas.openxmlformats.org/presentationml/2006/main">
-  <p:cSld>
-    <p:spTree>
-      <p:nvGrpSpPr>
-        <p:cNvPr id="1" name=""/>
-        <p:cNvGrpSpPr/>
-        <p:nvPr/>
-      </p:nvGrpSpPr>
-      <p:grpSpPr>
-        <a:xfrm>
-          <a:off x="0" y="0"/>
-          <a:ext cx="0" cy="0"/>
-          <a:chOff x="0" y="0"/>
-          <a:chExt cx="0" cy="0"/>
-        </a:xfrm>
-      </p:grpSpPr>
-      <p:sp>
-        <p:nvSpPr>
-          <p:cNvPr id="2" name="Titre 1"/>
-          <p:cNvSpPr>
-            <a:spLocks noGrp="1"/>
-          </p:cNvSpPr>
-          <p:nvPr>
-            <p:ph type="title"/>
-          </p:nvPr>
-        </p:nvSpPr>
-        <p:spPr/>
-        <p:txBody>
-          <a:bodyPr/>
-          <a:lstStyle/>
-          <a:p>
-            <a:endParaRPr lang="fr-FR"/>
-          </a:p>
-        </p:txBody>
-      </p:sp>
-      <p:sp>
-        <p:nvSpPr>
-          <p:cNvPr id="3" name="Espace réservé du contenu 2"/>
-          <p:cNvSpPr>
-            <a:spLocks noGrp="1"/>
-          </p:cNvSpPr>
-          <p:nvPr>
-            <p:ph idx="1"/>
-          </p:nvPr>
-        </p:nvSpPr>
-        <p:spPr/>
-        <p:txBody>
-          <a:bodyPr anchor="ctr"/>
-          <a:lstStyle/>
-          <a:p>
-            <a:pPr marL="0" indent="0" algn="ctr">
-              <a:buNone/>
-            </a:pPr>
-            <a:r>
-              <a:rPr lang="fr-FR" dirty="0" smtClean="0"/>
-              <a:t>TP</a:t>
-            </a:r>
-            <a:endParaRPr lang="fr-FR" dirty="0"/>
-          </a:p>
-        </p:txBody>
-      </p:sp>
-      <p:sp>
-        <p:nvSpPr>
-          <p:cNvPr id="4" name="Espace réservé du numéro de diapositive 3"/>
-          <p:cNvSpPr>
-            <a:spLocks noGrp="1"/>
-          </p:cNvSpPr>
-          <p:nvPr>
-            <p:ph type="sldNum" sz="quarter" idx="4"/>
-          </p:nvPr>
-        </p:nvSpPr>
-        <p:spPr/>
-        <p:txBody>
-          <a:bodyPr/>
-          <a:lstStyle/>
-          <a:p>
-            <a:fld id="{A6C87E8C-A1B1-CC4A-8C89-9A370644B80A}" type="slidenum">
-              <a:rPr lang="fr-FR" smtClean="0"/>
-              <a:pPr/>
-              <a:t>66</a:t>
-            </a:fld>
-            <a:endParaRPr lang="fr-FR" dirty="0"/>
-          </a:p>
-        </p:txBody>
-      </p:sp>
-      <p:sp>
-        <p:nvSpPr>
-          <p:cNvPr id="5" name="Espace réservé de la date 4"/>
-          <p:cNvSpPr>
-            <a:spLocks noGrp="1"/>
-          </p:cNvSpPr>
-          <p:nvPr>
-            <p:ph type="dt" sz="half" idx="2"/>
-          </p:nvPr>
-        </p:nvSpPr>
-        <p:spPr/>
-        <p:txBody>
-          <a:bodyPr/>
-          <a:lstStyle/>
-          <a:p>
-            <a:fld id="{91CF72A9-D654-5444-8857-3FC1397800DA}" type="datetime1">
-              <a:rPr lang="fr-FR" smtClean="0"/>
-              <a:t>07/09/15</a:t>
-            </a:fld>
-            <a:endParaRPr lang="fr-FR" dirty="0"/>
-          </a:p>
-        </p:txBody>
-      </p:sp>
-      <p:sp>
-        <p:nvSpPr>
-          <p:cNvPr id="6" name="Espace réservé du pied de page 5"/>
-          <p:cNvSpPr>
-            <a:spLocks noGrp="1"/>
-          </p:cNvSpPr>
-          <p:nvPr>
-            <p:ph type="ftr" sz="quarter" idx="3"/>
-          </p:nvPr>
-        </p:nvSpPr>
-        <p:spPr/>
-        <p:txBody>
-          <a:bodyPr/>
-          <a:lstStyle/>
-          <a:p>
-            <a:r>
-              <a:rPr lang="fr-FR" smtClean="0"/>
-              <a:t>Benoit Lange – benoit@lange.xyz – GMIN317 – Game Engine 2  </a:t>
-            </a:r>
-            <a:endParaRPr lang="fr-FR" b="1" dirty="0"/>
-          </a:p>
-        </p:txBody>
-      </p:sp>
-    </p:spTree>
-    <p:extLst>
-      <p:ext uri="{BB962C8B-B14F-4D97-AF65-F5344CB8AC3E}">
-        <p14:creationId xmlns:p14="http://schemas.microsoft.com/office/powerpoint/2010/main" val="1749808691"/>
       </p:ext>
     </p:extLst>
   </p:cSld>
@@ -21186,7 +20584,7 @@
           <a:p>
             <a:fld id="{19038BA7-713C-2544-8829-1AE6272C1240}" type="datetime1">
               <a:rPr lang="fr-FR" smtClean="0"/>
-              <a:t>07/09/15</a:t>
+              <a:t>17/09/15</a:t>
             </a:fld>
             <a:endParaRPr lang="fr-FR" dirty="0"/>
           </a:p>
@@ -21364,7 +20762,7 @@
           <a:p>
             <a:fld id="{19038BA7-713C-2544-8829-1AE6272C1240}" type="datetime1">
               <a:rPr lang="fr-FR" smtClean="0"/>
-              <a:t>07/09/15</a:t>
+              <a:t>17/09/15</a:t>
             </a:fld>
             <a:endParaRPr lang="fr-FR" dirty="0"/>
           </a:p>
@@ -21518,7 +20916,7 @@
           <a:p>
             <a:fld id="{19038BA7-713C-2544-8829-1AE6272C1240}" type="datetime1">
               <a:rPr lang="fr-FR" smtClean="0"/>
-              <a:t>07/09/15</a:t>
+              <a:t>17/09/15</a:t>
             </a:fld>
             <a:endParaRPr lang="fr-FR" dirty="0"/>
           </a:p>

</xml_diff>